<commit_message>
Refocus relational on data science
</commit_message>
<xml_diff>
--- a/day1_data_management/part0_introduction/00_appetite_whetting_context.pptx
+++ b/day1_data_management/part0_introduction/00_appetite_whetting_context.pptx
@@ -5,10 +5,10 @@
     <p:sldMasterId id="2147483648" r:id="rId1"/>
   </p:sldMasterIdLst>
   <p:notesMasterIdLst>
-    <p:notesMasterId r:id="rId21"/>
+    <p:notesMasterId r:id="rId23"/>
   </p:notesMasterIdLst>
   <p:handoutMasterIdLst>
-    <p:handoutMasterId r:id="rId22"/>
+    <p:handoutMasterId r:id="rId24"/>
   </p:handoutMasterIdLst>
   <p:sldIdLst>
     <p:sldId id="256" r:id="rId2"/>
@@ -30,11 +30,13 @@
     <p:sldId id="302" r:id="rId18"/>
     <p:sldId id="300" r:id="rId19"/>
     <p:sldId id="301" r:id="rId20"/>
+    <p:sldId id="304" r:id="rId21"/>
+    <p:sldId id="305" r:id="rId22"/>
   </p:sldIdLst>
   <p:sldSz cx="9144000" cy="6858000" type="screen4x3"/>
   <p:notesSz cx="6858000" cy="9144000"/>
   <p:custDataLst>
-    <p:tags r:id="rId24"/>
+    <p:tags r:id="rId26"/>
   </p:custDataLst>
   <p:defaultTextStyle>
     <a:defPPr>
@@ -246,7 +248,7 @@
           <a:p>
             <a:fld id="{A0386E03-FF8F-F043-A96F-D7A5AEA854C0}" type="datetimeFigureOut">
               <a:rPr lang="en-US" smtClean="0"/>
-              <a:t>6/20/15</a:t>
+              <a:t>6/21/15</a:t>
             </a:fld>
             <a:endParaRPr lang="en-US"/>
           </a:p>
@@ -412,7 +414,7 @@
           <a:p>
             <a:fld id="{FA207555-D59D-914D-83F8-C070483982F1}" type="datetimeFigureOut">
               <a:rPr lang="en-US" smtClean="0"/>
-              <a:t>6/20/15</a:t>
+              <a:t>6/21/15</a:t>
             </a:fld>
             <a:endParaRPr lang="en-US"/>
           </a:p>
@@ -1322,6 +1324,496 @@
 </p:notes>
 </file>
 
+<file path=ppt/notesSlides/notesSlide7.xml><?xml version="1.0" encoding="utf-8"?>
+<p:notes xmlns:a="http://schemas.openxmlformats.org/drawingml/2006/main" xmlns:r="http://schemas.openxmlformats.org/officeDocument/2006/relationships" xmlns:p="http://schemas.openxmlformats.org/presentationml/2006/main">
+  <p:cSld>
+    <p:spTree>
+      <p:nvGrpSpPr>
+        <p:cNvPr id="1" name=""/>
+        <p:cNvGrpSpPr/>
+        <p:nvPr/>
+      </p:nvGrpSpPr>
+      <p:grpSpPr>
+        <a:xfrm>
+          <a:off x="0" y="0"/>
+          <a:ext cx="0" cy="0"/>
+          <a:chOff x="0" y="0"/>
+          <a:chExt cx="0" cy="0"/>
+        </a:xfrm>
+      </p:grpSpPr>
+      <p:sp>
+        <p:nvSpPr>
+          <p:cNvPr id="21505" name="Slide Image Placeholder 1"/>
+          <p:cNvSpPr>
+            <a:spLocks noGrp="1" noRot="1" noChangeAspect="1" noTextEdit="1"/>
+          </p:cNvSpPr>
+          <p:nvPr>
+            <p:ph type="sldImg"/>
+          </p:nvPr>
+        </p:nvSpPr>
+        <p:spPr>
+          <a:ln/>
+        </p:spPr>
+      </p:sp>
+      <p:sp>
+        <p:nvSpPr>
+          <p:cNvPr id="21506" name="Notes Placeholder 2"/>
+          <p:cNvSpPr>
+            <a:spLocks noGrp="1"/>
+          </p:cNvSpPr>
+          <p:nvPr>
+            <p:ph type="body" idx="1"/>
+          </p:nvPr>
+        </p:nvSpPr>
+        <p:spPr>
+          <a:noFill/>
+          <a:ln/>
+          <a:extLst>
+            <a:ext uri="{909E8E84-426E-40dd-AFC4-6F175D3DCCD1}">
+              <a14:hiddenFill xmlns:a14="http://schemas.microsoft.com/office/drawing/2010/main">
+                <a:solidFill>
+                  <a:srgbClr val="FFFFFF"/>
+                </a:solidFill>
+              </a14:hiddenFill>
+            </a:ext>
+            <a:ext uri="{91240B29-F687-4f45-9708-019B960494DF}">
+              <a14:hiddenLine xmlns:a14="http://schemas.microsoft.com/office/drawing/2010/main" w="9525">
+                <a:solidFill>
+                  <a:srgbClr val="000000"/>
+                </a:solidFill>
+                <a:miter lim="800000"/>
+                <a:headEnd/>
+                <a:tailEnd/>
+              </a14:hiddenLine>
+            </a:ext>
+          </a:extLst>
+        </p:spPr>
+        <p:txBody>
+          <a:bodyPr/>
+          <a:lstStyle/>
+          <a:p>
+            <a:pPr eaLnBrk="1" hangingPunct="1"/>
+            <a:r>
+              <a:rPr lang="en-US">
+                <a:latin typeface="Times" charset="0"/>
+              </a:rPr>
+              <a:t>And processing power, either as raw processor speed or via novel multi-core and many-core architectures, is also continuing to increase exponentially…</a:t>
+            </a:r>
+          </a:p>
+        </p:txBody>
+      </p:sp>
+      <p:sp>
+        <p:nvSpPr>
+          <p:cNvPr id="21507" name="Slide Number Placeholder 3"/>
+          <p:cNvSpPr>
+            <a:spLocks noGrp="1"/>
+          </p:cNvSpPr>
+          <p:nvPr>
+            <p:ph type="sldNum" sz="quarter" idx="5"/>
+          </p:nvPr>
+        </p:nvSpPr>
+        <p:spPr>
+          <a:noFill/>
+          <a:ln/>
+          <a:extLst>
+            <a:ext uri="{909E8E84-426E-40dd-AFC4-6F175D3DCCD1}">
+              <a14:hiddenFill xmlns:a14="http://schemas.microsoft.com/office/drawing/2010/main">
+                <a:solidFill>
+                  <a:srgbClr val="FFFFFF"/>
+                </a:solidFill>
+              </a14:hiddenFill>
+            </a:ext>
+            <a:ext uri="{91240B29-F687-4f45-9708-019B960494DF}">
+              <a14:hiddenLine xmlns:a14="http://schemas.microsoft.com/office/drawing/2010/main" w="9525">
+                <a:solidFill>
+                  <a:srgbClr val="000000"/>
+                </a:solidFill>
+                <a:miter lim="800000"/>
+                <a:headEnd/>
+                <a:tailEnd/>
+              </a14:hiddenLine>
+            </a:ext>
+          </a:extLst>
+        </p:spPr>
+        <p:txBody>
+          <a:bodyPr/>
+          <a:lstStyle>
+            <a:lvl1pPr>
+              <a:defRPr sz="2400">
+                <a:solidFill>
+                  <a:schemeClr val="tx1"/>
+                </a:solidFill>
+                <a:latin typeface="Times" charset="0"/>
+                <a:ea typeface="ＭＳ Ｐゴシック" charset="0"/>
+                <a:cs typeface="ＭＳ Ｐゴシック" charset="0"/>
+              </a:defRPr>
+            </a:lvl1pPr>
+            <a:lvl2pPr marL="742950" indent="-285750">
+              <a:defRPr sz="2400">
+                <a:solidFill>
+                  <a:schemeClr val="tx1"/>
+                </a:solidFill>
+                <a:latin typeface="Times" charset="0"/>
+                <a:ea typeface="ＭＳ Ｐゴシック" charset="0"/>
+              </a:defRPr>
+            </a:lvl2pPr>
+            <a:lvl3pPr marL="1143000" indent="-228600">
+              <a:defRPr sz="2400">
+                <a:solidFill>
+                  <a:schemeClr val="tx1"/>
+                </a:solidFill>
+                <a:latin typeface="Times" charset="0"/>
+                <a:ea typeface="ＭＳ Ｐゴシック" charset="0"/>
+              </a:defRPr>
+            </a:lvl3pPr>
+            <a:lvl4pPr marL="1600200" indent="-228600">
+              <a:defRPr sz="2400">
+                <a:solidFill>
+                  <a:schemeClr val="tx1"/>
+                </a:solidFill>
+                <a:latin typeface="Times" charset="0"/>
+                <a:ea typeface="ＭＳ Ｐゴシック" charset="0"/>
+              </a:defRPr>
+            </a:lvl4pPr>
+            <a:lvl5pPr marL="2057400" indent="-228600">
+              <a:defRPr sz="2400">
+                <a:solidFill>
+                  <a:schemeClr val="tx1"/>
+                </a:solidFill>
+                <a:latin typeface="Times" charset="0"/>
+                <a:ea typeface="ＭＳ Ｐゴシック" charset="0"/>
+              </a:defRPr>
+            </a:lvl5pPr>
+            <a:lvl6pPr marL="2514600" indent="-228600" eaLnBrk="0" fontAlgn="base" hangingPunct="0">
+              <a:spcBef>
+                <a:spcPct val="0"/>
+              </a:spcBef>
+              <a:spcAft>
+                <a:spcPct val="0"/>
+              </a:spcAft>
+              <a:defRPr sz="2400">
+                <a:solidFill>
+                  <a:schemeClr val="tx1"/>
+                </a:solidFill>
+                <a:latin typeface="Times" charset="0"/>
+                <a:ea typeface="ＭＳ Ｐゴシック" charset="0"/>
+              </a:defRPr>
+            </a:lvl6pPr>
+            <a:lvl7pPr marL="2971800" indent="-228600" eaLnBrk="0" fontAlgn="base" hangingPunct="0">
+              <a:spcBef>
+                <a:spcPct val="0"/>
+              </a:spcBef>
+              <a:spcAft>
+                <a:spcPct val="0"/>
+              </a:spcAft>
+              <a:defRPr sz="2400">
+                <a:solidFill>
+                  <a:schemeClr val="tx1"/>
+                </a:solidFill>
+                <a:latin typeface="Times" charset="0"/>
+                <a:ea typeface="ＭＳ Ｐゴシック" charset="0"/>
+              </a:defRPr>
+            </a:lvl7pPr>
+            <a:lvl8pPr marL="3429000" indent="-228600" eaLnBrk="0" fontAlgn="base" hangingPunct="0">
+              <a:spcBef>
+                <a:spcPct val="0"/>
+              </a:spcBef>
+              <a:spcAft>
+                <a:spcPct val="0"/>
+              </a:spcAft>
+              <a:defRPr sz="2400">
+                <a:solidFill>
+                  <a:schemeClr val="tx1"/>
+                </a:solidFill>
+                <a:latin typeface="Times" charset="0"/>
+                <a:ea typeface="ＭＳ Ｐゴシック" charset="0"/>
+              </a:defRPr>
+            </a:lvl8pPr>
+            <a:lvl9pPr marL="3886200" indent="-228600" eaLnBrk="0" fontAlgn="base" hangingPunct="0">
+              <a:spcBef>
+                <a:spcPct val="0"/>
+              </a:spcBef>
+              <a:spcAft>
+                <a:spcPct val="0"/>
+              </a:spcAft>
+              <a:defRPr sz="2400">
+                <a:solidFill>
+                  <a:schemeClr val="tx1"/>
+                </a:solidFill>
+                <a:latin typeface="Times" charset="0"/>
+                <a:ea typeface="ＭＳ Ｐゴシック" charset="0"/>
+              </a:defRPr>
+            </a:lvl9pPr>
+          </a:lstStyle>
+          <a:p>
+            <a:fld id="{F097379F-56C5-2D4A-B126-51B655899E47}" type="slidenum">
+              <a:rPr lang="en-US" sz="1200"/>
+              <a:pPr/>
+              <a:t>20</a:t>
+            </a:fld>
+            <a:endParaRPr lang="en-US" sz="1200"/>
+          </a:p>
+        </p:txBody>
+      </p:sp>
+    </p:spTree>
+  </p:cSld>
+  <p:clrMapOvr>
+    <a:masterClrMapping/>
+  </p:clrMapOvr>
+</p:notes>
+</file>
+
+<file path=ppt/notesSlides/notesSlide8.xml><?xml version="1.0" encoding="utf-8"?>
+<p:notes xmlns:a="http://schemas.openxmlformats.org/drawingml/2006/main" xmlns:r="http://schemas.openxmlformats.org/officeDocument/2006/relationships" xmlns:p="http://schemas.openxmlformats.org/presentationml/2006/main">
+  <p:cSld>
+    <p:spTree>
+      <p:nvGrpSpPr>
+        <p:cNvPr id="1" name=""/>
+        <p:cNvGrpSpPr/>
+        <p:nvPr/>
+      </p:nvGrpSpPr>
+      <p:grpSpPr>
+        <a:xfrm>
+          <a:off x="0" y="0"/>
+          <a:ext cx="0" cy="0"/>
+          <a:chOff x="0" y="0"/>
+          <a:chExt cx="0" cy="0"/>
+        </a:xfrm>
+      </p:grpSpPr>
+      <p:sp>
+        <p:nvSpPr>
+          <p:cNvPr id="25601" name="Slide Image Placeholder 1"/>
+          <p:cNvSpPr>
+            <a:spLocks noGrp="1" noRot="1" noChangeAspect="1" noTextEdit="1"/>
+          </p:cNvSpPr>
+          <p:nvPr>
+            <p:ph type="sldImg"/>
+          </p:nvPr>
+        </p:nvSpPr>
+        <p:spPr>
+          <a:ln/>
+        </p:spPr>
+      </p:sp>
+      <p:sp>
+        <p:nvSpPr>
+          <p:cNvPr id="25602" name="Notes Placeholder 2"/>
+          <p:cNvSpPr>
+            <a:spLocks noGrp="1"/>
+          </p:cNvSpPr>
+          <p:nvPr>
+            <p:ph type="body" idx="1"/>
+          </p:nvPr>
+        </p:nvSpPr>
+        <p:spPr>
+          <a:noFill/>
+          <a:ln/>
+          <a:extLst>
+            <a:ext uri="{909E8E84-426E-40dd-AFC4-6F175D3DCCD1}">
+              <a14:hiddenFill xmlns:a14="http://schemas.microsoft.com/office/drawing/2010/main">
+                <a:solidFill>
+                  <a:srgbClr val="FFFFFF"/>
+                </a:solidFill>
+              </a14:hiddenFill>
+            </a:ext>
+            <a:ext uri="{91240B29-F687-4f45-9708-019B960494DF}">
+              <a14:hiddenLine xmlns:a14="http://schemas.microsoft.com/office/drawing/2010/main" w="9525">
+                <a:solidFill>
+                  <a:srgbClr val="000000"/>
+                </a:solidFill>
+                <a:miter lim="800000"/>
+                <a:headEnd/>
+                <a:tailEnd/>
+              </a14:hiddenLine>
+            </a:ext>
+          </a:extLst>
+        </p:spPr>
+        <p:txBody>
+          <a:bodyPr/>
+          <a:lstStyle/>
+          <a:p>
+            <a:pPr eaLnBrk="1" hangingPunct="1"/>
+            <a:r>
+              <a:rPr lang="en-US">
+                <a:latin typeface="Times" charset="0"/>
+              </a:rPr>
+              <a:t>… but human cognitive capacity is remaining constant. How can computing technologies help scientists make sense out of these vast and complex data sets?</a:t>
+            </a:r>
+          </a:p>
+          <a:p>
+            <a:pPr eaLnBrk="1" hangingPunct="1"/>
+            <a:endParaRPr lang="en-US">
+              <a:latin typeface="Times" charset="0"/>
+            </a:endParaRPr>
+          </a:p>
+          <a:p>
+            <a:pPr eaLnBrk="1" hangingPunct="1"/>
+            <a:endParaRPr lang="en-US">
+              <a:latin typeface="Times" charset="0"/>
+            </a:endParaRPr>
+          </a:p>
+        </p:txBody>
+      </p:sp>
+      <p:sp>
+        <p:nvSpPr>
+          <p:cNvPr id="25603" name="Slide Number Placeholder 3"/>
+          <p:cNvSpPr>
+            <a:spLocks noGrp="1"/>
+          </p:cNvSpPr>
+          <p:nvPr>
+            <p:ph type="sldNum" sz="quarter" idx="5"/>
+          </p:nvPr>
+        </p:nvSpPr>
+        <p:spPr>
+          <a:noFill/>
+          <a:ln/>
+          <a:extLst>
+            <a:ext uri="{909E8E84-426E-40dd-AFC4-6F175D3DCCD1}">
+              <a14:hiddenFill xmlns:a14="http://schemas.microsoft.com/office/drawing/2010/main">
+                <a:solidFill>
+                  <a:srgbClr val="FFFFFF"/>
+                </a:solidFill>
+              </a14:hiddenFill>
+            </a:ext>
+            <a:ext uri="{91240B29-F687-4f45-9708-019B960494DF}">
+              <a14:hiddenLine xmlns:a14="http://schemas.microsoft.com/office/drawing/2010/main" w="9525">
+                <a:solidFill>
+                  <a:srgbClr val="000000"/>
+                </a:solidFill>
+                <a:miter lim="800000"/>
+                <a:headEnd/>
+                <a:tailEnd/>
+              </a14:hiddenLine>
+            </a:ext>
+          </a:extLst>
+        </p:spPr>
+        <p:txBody>
+          <a:bodyPr/>
+          <a:lstStyle>
+            <a:lvl1pPr>
+              <a:defRPr sz="2400">
+                <a:solidFill>
+                  <a:schemeClr val="tx1"/>
+                </a:solidFill>
+                <a:latin typeface="Times" charset="0"/>
+                <a:ea typeface="ＭＳ Ｐゴシック" charset="0"/>
+                <a:cs typeface="ＭＳ Ｐゴシック" charset="0"/>
+              </a:defRPr>
+            </a:lvl1pPr>
+            <a:lvl2pPr marL="742950" indent="-285750">
+              <a:defRPr sz="2400">
+                <a:solidFill>
+                  <a:schemeClr val="tx1"/>
+                </a:solidFill>
+                <a:latin typeface="Times" charset="0"/>
+                <a:ea typeface="ＭＳ Ｐゴシック" charset="0"/>
+              </a:defRPr>
+            </a:lvl2pPr>
+            <a:lvl3pPr marL="1143000" indent="-228600">
+              <a:defRPr sz="2400">
+                <a:solidFill>
+                  <a:schemeClr val="tx1"/>
+                </a:solidFill>
+                <a:latin typeface="Times" charset="0"/>
+                <a:ea typeface="ＭＳ Ｐゴシック" charset="0"/>
+              </a:defRPr>
+            </a:lvl3pPr>
+            <a:lvl4pPr marL="1600200" indent="-228600">
+              <a:defRPr sz="2400">
+                <a:solidFill>
+                  <a:schemeClr val="tx1"/>
+                </a:solidFill>
+                <a:latin typeface="Times" charset="0"/>
+                <a:ea typeface="ＭＳ Ｐゴシック" charset="0"/>
+              </a:defRPr>
+            </a:lvl4pPr>
+            <a:lvl5pPr marL="2057400" indent="-228600">
+              <a:defRPr sz="2400">
+                <a:solidFill>
+                  <a:schemeClr val="tx1"/>
+                </a:solidFill>
+                <a:latin typeface="Times" charset="0"/>
+                <a:ea typeface="ＭＳ Ｐゴシック" charset="0"/>
+              </a:defRPr>
+            </a:lvl5pPr>
+            <a:lvl6pPr marL="2514600" indent="-228600" eaLnBrk="0" fontAlgn="base" hangingPunct="0">
+              <a:spcBef>
+                <a:spcPct val="0"/>
+              </a:spcBef>
+              <a:spcAft>
+                <a:spcPct val="0"/>
+              </a:spcAft>
+              <a:defRPr sz="2400">
+                <a:solidFill>
+                  <a:schemeClr val="tx1"/>
+                </a:solidFill>
+                <a:latin typeface="Times" charset="0"/>
+                <a:ea typeface="ＭＳ Ｐゴシック" charset="0"/>
+              </a:defRPr>
+            </a:lvl6pPr>
+            <a:lvl7pPr marL="2971800" indent="-228600" eaLnBrk="0" fontAlgn="base" hangingPunct="0">
+              <a:spcBef>
+                <a:spcPct val="0"/>
+              </a:spcBef>
+              <a:spcAft>
+                <a:spcPct val="0"/>
+              </a:spcAft>
+              <a:defRPr sz="2400">
+                <a:solidFill>
+                  <a:schemeClr val="tx1"/>
+                </a:solidFill>
+                <a:latin typeface="Times" charset="0"/>
+                <a:ea typeface="ＭＳ Ｐゴシック" charset="0"/>
+              </a:defRPr>
+            </a:lvl7pPr>
+            <a:lvl8pPr marL="3429000" indent="-228600" eaLnBrk="0" fontAlgn="base" hangingPunct="0">
+              <a:spcBef>
+                <a:spcPct val="0"/>
+              </a:spcBef>
+              <a:spcAft>
+                <a:spcPct val="0"/>
+              </a:spcAft>
+              <a:defRPr sz="2400">
+                <a:solidFill>
+                  <a:schemeClr val="tx1"/>
+                </a:solidFill>
+                <a:latin typeface="Times" charset="0"/>
+                <a:ea typeface="ＭＳ Ｐゴシック" charset="0"/>
+              </a:defRPr>
+            </a:lvl8pPr>
+            <a:lvl9pPr marL="3886200" indent="-228600" eaLnBrk="0" fontAlgn="base" hangingPunct="0">
+              <a:spcBef>
+                <a:spcPct val="0"/>
+              </a:spcBef>
+              <a:spcAft>
+                <a:spcPct val="0"/>
+              </a:spcAft>
+              <a:defRPr sz="2400">
+                <a:solidFill>
+                  <a:schemeClr val="tx1"/>
+                </a:solidFill>
+                <a:latin typeface="Times" charset="0"/>
+                <a:ea typeface="ＭＳ Ｐゴシック" charset="0"/>
+              </a:defRPr>
+            </a:lvl9pPr>
+          </a:lstStyle>
+          <a:p>
+            <a:fld id="{767D98E3-D453-6143-B8B0-11A0437A913B}" type="slidenum">
+              <a:rPr lang="en-US" sz="1200"/>
+              <a:pPr/>
+              <a:t>21</a:t>
+            </a:fld>
+            <a:endParaRPr lang="en-US" sz="1200"/>
+          </a:p>
+        </p:txBody>
+      </p:sp>
+    </p:spTree>
+  </p:cSld>
+  <p:clrMapOvr>
+    <a:masterClrMapping/>
+  </p:clrMapOvr>
+</p:notes>
+</file>
+
 <file path=ppt/slideLayouts/slideLayout1.xml><?xml version="1.0" encoding="utf-8"?>
 <p:sldLayout xmlns:a="http://schemas.openxmlformats.org/drawingml/2006/main" xmlns:r="http://schemas.openxmlformats.org/officeDocument/2006/relationships" xmlns:p="http://schemas.openxmlformats.org/presentationml/2006/main" type="title" preserve="1">
   <p:cSld name="Title Slide">
@@ -1861,7 +2353,7 @@
           <a:p>
             <a:fld id="{46284D85-FEAC-6D4D-ADD9-3BD8F167427A}" type="datetime1">
               <a:rPr lang="en-US" smtClean="0"/>
-              <a:t>6/20/15</a:t>
+              <a:t>6/21/15</a:t>
             </a:fld>
             <a:endParaRPr lang="en-US"/>
           </a:p>
@@ -2079,7 +2571,7 @@
           <a:p>
             <a:fld id="{AA000AE5-584D-C440-9AD8-C8FC349C2170}" type="datetime1">
               <a:rPr lang="en-US" smtClean="0"/>
-              <a:t>6/20/15</a:t>
+              <a:t>6/21/15</a:t>
             </a:fld>
             <a:endParaRPr lang="en-US"/>
           </a:p>
@@ -2279,7 +2771,7 @@
           <a:p>
             <a:fld id="{78C3D354-CDAA-004A-BBB7-92BEBA53B5C0}" type="datetime1">
               <a:rPr lang="en-US" smtClean="0"/>
-              <a:t>6/20/15</a:t>
+              <a:t>6/21/15</a:t>
             </a:fld>
             <a:endParaRPr lang="en-US"/>
           </a:p>
@@ -2698,7 +3190,7 @@
           <a:p>
             <a:fld id="{7B55FEDD-6FD9-7942-8E57-CDDA6D5C3512}" type="datetime1">
               <a:rPr lang="en-US" smtClean="0"/>
-              <a:t>6/20/15</a:t>
+              <a:t>6/21/15</a:t>
             </a:fld>
             <a:endParaRPr lang="en-US"/>
           </a:p>
@@ -2974,7 +3466,7 @@
           <a:p>
             <a:fld id="{C460E162-5E18-CC42-AEFF-80654EBA5EC9}" type="datetime1">
               <a:rPr lang="en-US" smtClean="0"/>
-              <a:t>6/20/15</a:t>
+              <a:t>6/21/15</a:t>
             </a:fld>
             <a:endParaRPr lang="en-US"/>
           </a:p>
@@ -3492,7 +3984,7 @@
           <a:p>
             <a:fld id="{7D29959A-35A8-9348-83C4-31B0671CA6F4}" type="datetime1">
               <a:rPr lang="en-US" smtClean="0"/>
-              <a:t>6/20/15</a:t>
+              <a:t>6/21/15</a:t>
             </a:fld>
             <a:endParaRPr lang="en-US"/>
           </a:p>
@@ -4144,7 +4636,7 @@
           <a:p>
             <a:fld id="{1EED5640-A054-AD43-A009-5122F633A555}" type="datetime1">
               <a:rPr lang="en-US" smtClean="0"/>
-              <a:t>6/20/15</a:t>
+              <a:t>6/21/15</a:t>
             </a:fld>
             <a:endParaRPr lang="en-US"/>
           </a:p>
@@ -4492,7 +4984,7 @@
           <a:p>
             <a:fld id="{B144F366-C044-4B4C-9ED0-43C134576ECA}" type="datetime1">
               <a:rPr lang="en-US" smtClean="0"/>
-              <a:t>6/20/15</a:t>
+              <a:t>6/21/15</a:t>
             </a:fld>
             <a:endParaRPr lang="en-US"/>
           </a:p>
@@ -4817,7 +5309,7 @@
           <a:p>
             <a:fld id="{65FCB4E5-F5CA-CD47-9AE3-A07BD6AB5419}" type="datetime1">
               <a:rPr lang="en-US" smtClean="0"/>
-              <a:t>6/20/15</a:t>
+              <a:t>6/21/15</a:t>
             </a:fld>
             <a:endParaRPr lang="en-US"/>
           </a:p>
@@ -5114,7 +5606,7 @@
           <a:p>
             <a:fld id="{DFF7E3BA-6CFD-3F4B-B6A9-0E95C2C35C95}" type="datetime1">
               <a:rPr lang="en-US" smtClean="0"/>
-              <a:t>6/20/15</a:t>
+              <a:t>6/21/15</a:t>
             </a:fld>
             <a:endParaRPr lang="en-US"/>
           </a:p>
@@ -5600,7 +6092,7 @@
           <a:p>
             <a:fld id="{D4C999BE-CC0D-BA40-AC64-6591B8579716}" type="datetime1">
               <a:rPr lang="en-US" smtClean="0"/>
-              <a:t>6/20/15</a:t>
+              <a:t>6/21/15</a:t>
             </a:fld>
             <a:endParaRPr lang="en-US"/>
           </a:p>
@@ -6100,7 +6592,7 @@
           <a:p>
             <a:fld id="{7BC5C81F-24D6-B24D-AABC-683A945C8813}" type="datetime1">
               <a:rPr lang="en-US" smtClean="0"/>
-              <a:t>6/20/15</a:t>
+              <a:t>6/21/15</a:t>
             </a:fld>
             <a:endParaRPr lang="en-US"/>
           </a:p>
@@ -6784,7 +7276,7 @@
           <a:p>
             <a:fld id="{7B55FEDD-6FD9-7942-8E57-CDDA6D5C3512}" type="datetime1">
               <a:rPr lang="en-US" smtClean="0"/>
-              <a:t>6/20/15</a:t>
+              <a:t>6/21/15</a:t>
             </a:fld>
             <a:endParaRPr lang="en-US"/>
           </a:p>
@@ -7483,7 +7975,7 @@
           <a:p>
             <a:fld id="{7B55FEDD-6FD9-7942-8E57-CDDA6D5C3512}" type="datetime1">
               <a:rPr lang="en-US" smtClean="0"/>
-              <a:t>6/20/15</a:t>
+              <a:t>6/21/15</a:t>
             </a:fld>
             <a:endParaRPr lang="en-US"/>
           </a:p>
@@ -7796,7 +8288,7 @@
           <a:p>
             <a:fld id="{B144F366-C044-4B4C-9ED0-43C134576ECA}" type="datetime1">
               <a:rPr lang="en-US" smtClean="0"/>
-              <a:t>6/20/15</a:t>
+              <a:t>6/21/15</a:t>
             </a:fld>
             <a:endParaRPr lang="en-US"/>
           </a:p>
@@ -7988,7 +8480,7 @@
           <a:p>
             <a:fld id="{7B55FEDD-6FD9-7942-8E57-CDDA6D5C3512}" type="datetime1">
               <a:rPr lang="en-US" smtClean="0"/>
-              <a:t>6/20/15</a:t>
+              <a:t>6/21/15</a:t>
             </a:fld>
             <a:endParaRPr lang="en-US"/>
           </a:p>
@@ -8125,7 +8617,7 @@
           <a:p>
             <a:fld id="{7B55FEDD-6FD9-7942-8E57-CDDA6D5C3512}" type="datetime1">
               <a:rPr lang="en-US" smtClean="0"/>
-              <a:t>6/20/15</a:t>
+              <a:t>6/21/15</a:t>
             </a:fld>
             <a:endParaRPr lang="en-US"/>
           </a:p>
@@ -8259,7 +8751,7 @@
           <a:p>
             <a:fld id="{B144F366-C044-4B4C-9ED0-43C134576ECA}" type="datetime1">
               <a:rPr lang="en-US" smtClean="0"/>
-              <a:t>6/20/15</a:t>
+              <a:t>6/21/15</a:t>
             </a:fld>
             <a:endParaRPr lang="en-US"/>
           </a:p>
@@ -8457,7 +8949,7 @@
           <a:p>
             <a:fld id="{65FCB4E5-F5CA-CD47-9AE3-A07BD6AB5419}" type="datetime1">
               <a:rPr lang="en-US" smtClean="0"/>
-              <a:t>6/20/15</a:t>
+              <a:t>6/21/15</a:t>
             </a:fld>
             <a:endParaRPr lang="en-US"/>
           </a:p>
@@ -9108,7 +9600,7 @@
           <a:p>
             <a:fld id="{7B55FEDD-6FD9-7942-8E57-CDDA6D5C3512}" type="datetime1">
               <a:rPr lang="en-US" smtClean="0"/>
-              <a:t>6/20/15</a:t>
+              <a:t>6/21/15</a:t>
             </a:fld>
             <a:endParaRPr lang="en-US"/>
           </a:p>
@@ -10131,6 +10623,1561 @@
 </p:sld>
 </file>
 
+<file path=ppt/slides/slide20.xml><?xml version="1.0" encoding="utf-8"?>
+<p:sld xmlns:a="http://schemas.openxmlformats.org/drawingml/2006/main" xmlns:r="http://schemas.openxmlformats.org/officeDocument/2006/relationships" xmlns:p="http://schemas.openxmlformats.org/presentationml/2006/main">
+  <p:cSld>
+    <p:spTree>
+      <p:nvGrpSpPr>
+        <p:cNvPr id="1" name=""/>
+        <p:cNvGrpSpPr/>
+        <p:nvPr/>
+      </p:nvGrpSpPr>
+      <p:grpSpPr>
+        <a:xfrm>
+          <a:off x="0" y="0"/>
+          <a:ext cx="0" cy="0"/>
+          <a:chOff x="0" y="0"/>
+          <a:chExt cx="0" cy="0"/>
+        </a:xfrm>
+      </p:grpSpPr>
+      <p:graphicFrame>
+        <p:nvGraphicFramePr>
+          <p:cNvPr id="20481" name="Object 2"/>
+          <p:cNvGraphicFramePr>
+            <a:graphicFrameLocks noChangeAspect="1"/>
+          </p:cNvGraphicFramePr>
+          <p:nvPr/>
+        </p:nvGraphicFramePr>
+        <p:xfrm>
+          <a:off x="2032000" y="1622425"/>
+          <a:ext cx="5078413" cy="3611563"/>
+        </p:xfrm>
+        <a:graphic>
+          <a:graphicData uri="http://schemas.openxmlformats.org/presentationml/2006/ole">
+            <mc:AlternateContent xmlns:mc="http://schemas.openxmlformats.org/markup-compatibility/2006">
+              <mc:Choice xmlns:v="urn:schemas-microsoft-com:vml" Requires="v">
+                <p:oleObj spid="_x0000_s1025" name="Worksheet" r:id="rId4" imgW="5077005" imgH="3610458" progId="Excel.Sheet.8">
+                  <p:embed/>
+                </p:oleObj>
+              </mc:Choice>
+              <mc:Fallback>
+                <p:oleObj name="Worksheet" r:id="rId4" imgW="5077005" imgH="3610458" progId="Excel.Sheet.8">
+                  <p:embed/>
+                  <p:pic>
+                    <p:nvPicPr>
+                      <p:cNvPr id="0" name=""/>
+                      <p:cNvPicPr>
+                        <a:picLocks noChangeAspect="1" noChangeArrowheads="1"/>
+                      </p:cNvPicPr>
+                      <p:nvPr/>
+                    </p:nvPicPr>
+                    <p:blipFill>
+                      <a:blip r:embed="rId5">
+                        <a:extLst>
+                          <a:ext uri="{28A0092B-C50C-407E-A947-70E740481C1C}">
+                            <a14:useLocalDpi xmlns:a14="http://schemas.microsoft.com/office/drawing/2010/main" val="0"/>
+                          </a:ext>
+                        </a:extLst>
+                      </a:blip>
+                      <a:srcRect/>
+                      <a:stretch>
+                        <a:fillRect/>
+                      </a:stretch>
+                    </p:blipFill>
+                    <p:spPr bwMode="auto">
+                      <a:xfrm>
+                        <a:off x="2032000" y="1622425"/>
+                        <a:ext cx="5078413" cy="3611563"/>
+                      </a:xfrm>
+                      <a:prstGeom prst="rect">
+                        <a:avLst/>
+                      </a:prstGeom>
+                      <a:noFill/>
+                      <a:ln>
+                        <a:noFill/>
+                      </a:ln>
+                      <a:effectLst/>
+                      <a:extLst>
+                        <a:ext uri="{909E8E84-426E-40dd-AFC4-6F175D3DCCD1}">
+                          <a14:hiddenFill xmlns:a14="http://schemas.microsoft.com/office/drawing/2010/main">
+                            <a:solidFill>
+                              <a:schemeClr val="accent1"/>
+                            </a:solidFill>
+                          </a14:hiddenFill>
+                        </a:ext>
+                        <a:ext uri="{91240B29-F687-4f45-9708-019B960494DF}">
+                          <a14:hiddenLine xmlns:a14="http://schemas.microsoft.com/office/drawing/2010/main" w="9525">
+                            <a:solidFill>
+                              <a:schemeClr val="tx1"/>
+                            </a:solidFill>
+                            <a:miter lim="800000"/>
+                            <a:headEnd/>
+                            <a:tailEnd/>
+                          </a14:hiddenLine>
+                        </a:ext>
+                        <a:ext uri="{AF507438-7753-43e0-B8FC-AC1667EBCBE1}">
+                          <a14:hiddenEffects xmlns:a14="http://schemas.microsoft.com/office/drawing/2010/main">
+                            <a:effectLst>
+                              <a:outerShdw blurRad="63500" dist="38099" dir="2700000" algn="ctr" rotWithShape="0">
+                                <a:schemeClr val="bg2">
+                                  <a:alpha val="74997"/>
+                                </a:schemeClr>
+                              </a:outerShdw>
+                            </a:effectLst>
+                          </a14:hiddenEffects>
+                        </a:ext>
+                      </a:extLst>
+                    </p:spPr>
+                  </p:pic>
+                </p:oleObj>
+              </mc:Fallback>
+            </mc:AlternateContent>
+          </a:graphicData>
+        </a:graphic>
+      </p:graphicFrame>
+      <p:graphicFrame>
+        <p:nvGraphicFramePr>
+          <p:cNvPr id="20482" name="Object 3"/>
+          <p:cNvGraphicFramePr>
+            <a:graphicFrameLocks noChangeAspect="1"/>
+          </p:cNvGraphicFramePr>
+          <p:nvPr>
+            <p:extLst>
+              <p:ext uri="{D42A27DB-BD31-4B8C-83A1-F6EECF244321}">
+                <p14:modId xmlns:p14="http://schemas.microsoft.com/office/powerpoint/2010/main" val="335979659"/>
+              </p:ext>
+            </p:extLst>
+          </p:nvPr>
+        </p:nvGraphicFramePr>
+        <p:xfrm>
+          <a:off x="1396636" y="1619249"/>
+          <a:ext cx="5718539" cy="4068103"/>
+        </p:xfrm>
+        <a:graphic>
+          <a:graphicData uri="http://schemas.openxmlformats.org/presentationml/2006/ole">
+            <mc:AlternateContent xmlns:mc="http://schemas.openxmlformats.org/markup-compatibility/2006">
+              <mc:Choice xmlns:v="urn:schemas-microsoft-com:vml" Requires="v">
+                <p:oleObj spid="_x0000_s1026" name="Worksheet" r:id="rId6" imgW="5086631" imgH="3619886" progId="Excel.Sheet.8">
+                  <p:embed/>
+                </p:oleObj>
+              </mc:Choice>
+              <mc:Fallback>
+                <p:oleObj name="Worksheet" r:id="rId6" imgW="5086631" imgH="3619886" progId="Excel.Sheet.8">
+                  <p:embed/>
+                  <p:pic>
+                    <p:nvPicPr>
+                      <p:cNvPr id="0" name=""/>
+                      <p:cNvPicPr>
+                        <a:picLocks noChangeAspect="1" noChangeArrowheads="1"/>
+                      </p:cNvPicPr>
+                      <p:nvPr/>
+                    </p:nvPicPr>
+                    <p:blipFill>
+                      <a:blip r:embed="rId7">
+                        <a:extLst>
+                          <a:ext uri="{28A0092B-C50C-407E-A947-70E740481C1C}">
+                            <a14:useLocalDpi xmlns:a14="http://schemas.microsoft.com/office/drawing/2010/main" val="0"/>
+                          </a:ext>
+                        </a:extLst>
+                      </a:blip>
+                      <a:srcRect/>
+                      <a:stretch>
+                        <a:fillRect/>
+                      </a:stretch>
+                    </p:blipFill>
+                    <p:spPr bwMode="auto">
+                      <a:xfrm>
+                        <a:off x="1396636" y="1619249"/>
+                        <a:ext cx="5718539" cy="4068103"/>
+                      </a:xfrm>
+                      <a:prstGeom prst="rect">
+                        <a:avLst/>
+                      </a:prstGeom>
+                      <a:noFill/>
+                      <a:ln>
+                        <a:noFill/>
+                      </a:ln>
+                      <a:effectLst/>
+                      <a:extLst/>
+                    </p:spPr>
+                  </p:pic>
+                </p:oleObj>
+              </mc:Fallback>
+            </mc:AlternateContent>
+          </a:graphicData>
+        </a:graphic>
+      </p:graphicFrame>
+      <p:sp>
+        <p:nvSpPr>
+          <p:cNvPr id="20483" name="Rectangle 4"/>
+          <p:cNvSpPr>
+            <a:spLocks noGrp="1" noChangeArrowheads="1"/>
+          </p:cNvSpPr>
+          <p:nvPr>
+            <p:ph type="title"/>
+          </p:nvPr>
+        </p:nvSpPr>
+        <p:spPr>
+          <a:xfrm>
+            <a:off x="267638" y="751420"/>
+            <a:ext cx="8686799" cy="863600"/>
+          </a:xfrm>
+        </p:spPr>
+        <p:txBody>
+          <a:bodyPr/>
+          <a:lstStyle/>
+          <a:p>
+            <a:pPr algn="l" eaLnBrk="1" hangingPunct="1"/>
+            <a:r>
+              <a:rPr lang="en-US" sz="2500" dirty="0" smtClean="0">
+                <a:latin typeface="Arial" charset="0"/>
+              </a:rPr>
+              <a:t>What </a:t>
+            </a:r>
+            <a:r>
+              <a:rPr lang="en-US" sz="2500" dirty="0">
+                <a:latin typeface="Arial" charset="0"/>
+              </a:rPr>
+              <a:t>is the rate-limiting step in data understanding?</a:t>
+            </a:r>
+          </a:p>
+        </p:txBody>
+      </p:sp>
+      <p:sp>
+        <p:nvSpPr>
+          <p:cNvPr id="20484" name="Text Box 5"/>
+          <p:cNvSpPr txBox="1">
+            <a:spLocks noChangeArrowheads="1"/>
+          </p:cNvSpPr>
+          <p:nvPr/>
+        </p:nvSpPr>
+        <p:spPr bwMode="auto">
+          <a:xfrm>
+            <a:off x="4387850" y="2079625"/>
+            <a:ext cx="2236788" cy="641350"/>
+          </a:xfrm>
+          <a:prstGeom prst="rect">
+            <a:avLst/>
+          </a:prstGeom>
+          <a:noFill/>
+          <a:ln>
+            <a:noFill/>
+          </a:ln>
+          <a:extLst>
+            <a:ext uri="{909E8E84-426E-40dd-AFC4-6F175D3DCCD1}">
+              <a14:hiddenFill xmlns:a14="http://schemas.microsoft.com/office/drawing/2010/main">
+                <a:solidFill>
+                  <a:srgbClr val="FFFFFF"/>
+                </a:solidFill>
+              </a14:hiddenFill>
+            </a:ext>
+            <a:ext uri="{91240B29-F687-4f45-9708-019B960494DF}">
+              <a14:hiddenLine xmlns:a14="http://schemas.microsoft.com/office/drawing/2010/main" w="9525">
+                <a:solidFill>
+                  <a:srgbClr val="000000"/>
+                </a:solidFill>
+                <a:miter lim="800000"/>
+                <a:headEnd/>
+                <a:tailEnd/>
+              </a14:hiddenLine>
+            </a:ext>
+          </a:extLst>
+        </p:spPr>
+        <p:txBody>
+          <a:bodyPr>
+            <a:spAutoFit/>
+          </a:bodyPr>
+          <a:lstStyle>
+            <a:lvl1pPr>
+              <a:defRPr sz="2400">
+                <a:solidFill>
+                  <a:schemeClr val="tx1"/>
+                </a:solidFill>
+                <a:latin typeface="Times" charset="0"/>
+                <a:ea typeface="ＭＳ Ｐゴシック" charset="0"/>
+                <a:cs typeface="ＭＳ Ｐゴシック" charset="0"/>
+              </a:defRPr>
+            </a:lvl1pPr>
+            <a:lvl2pPr marL="742950" indent="-285750">
+              <a:defRPr sz="2400">
+                <a:solidFill>
+                  <a:schemeClr val="tx1"/>
+                </a:solidFill>
+                <a:latin typeface="Times" charset="0"/>
+                <a:ea typeface="ＭＳ Ｐゴシック" charset="0"/>
+              </a:defRPr>
+            </a:lvl2pPr>
+            <a:lvl3pPr marL="1143000" indent="-228600">
+              <a:defRPr sz="2400">
+                <a:solidFill>
+                  <a:schemeClr val="tx1"/>
+                </a:solidFill>
+                <a:latin typeface="Times" charset="0"/>
+                <a:ea typeface="ＭＳ Ｐゴシック" charset="0"/>
+              </a:defRPr>
+            </a:lvl3pPr>
+            <a:lvl4pPr marL="1600200" indent="-228600">
+              <a:defRPr sz="2400">
+                <a:solidFill>
+                  <a:schemeClr val="tx1"/>
+                </a:solidFill>
+                <a:latin typeface="Times" charset="0"/>
+                <a:ea typeface="ＭＳ Ｐゴシック" charset="0"/>
+              </a:defRPr>
+            </a:lvl4pPr>
+            <a:lvl5pPr marL="2057400" indent="-228600">
+              <a:defRPr sz="2400">
+                <a:solidFill>
+                  <a:schemeClr val="tx1"/>
+                </a:solidFill>
+                <a:latin typeface="Times" charset="0"/>
+                <a:ea typeface="ＭＳ Ｐゴシック" charset="0"/>
+              </a:defRPr>
+            </a:lvl5pPr>
+            <a:lvl6pPr marL="2514600" indent="-228600" eaLnBrk="0" fontAlgn="base" hangingPunct="0">
+              <a:spcBef>
+                <a:spcPct val="0"/>
+              </a:spcBef>
+              <a:spcAft>
+                <a:spcPct val="0"/>
+              </a:spcAft>
+              <a:defRPr sz="2400">
+                <a:solidFill>
+                  <a:schemeClr val="tx1"/>
+                </a:solidFill>
+                <a:latin typeface="Times" charset="0"/>
+                <a:ea typeface="ＭＳ Ｐゴシック" charset="0"/>
+              </a:defRPr>
+            </a:lvl6pPr>
+            <a:lvl7pPr marL="2971800" indent="-228600" eaLnBrk="0" fontAlgn="base" hangingPunct="0">
+              <a:spcBef>
+                <a:spcPct val="0"/>
+              </a:spcBef>
+              <a:spcAft>
+                <a:spcPct val="0"/>
+              </a:spcAft>
+              <a:defRPr sz="2400">
+                <a:solidFill>
+                  <a:schemeClr val="tx1"/>
+                </a:solidFill>
+                <a:latin typeface="Times" charset="0"/>
+                <a:ea typeface="ＭＳ Ｐゴシック" charset="0"/>
+              </a:defRPr>
+            </a:lvl7pPr>
+            <a:lvl8pPr marL="3429000" indent="-228600" eaLnBrk="0" fontAlgn="base" hangingPunct="0">
+              <a:spcBef>
+                <a:spcPct val="0"/>
+              </a:spcBef>
+              <a:spcAft>
+                <a:spcPct val="0"/>
+              </a:spcAft>
+              <a:defRPr sz="2400">
+                <a:solidFill>
+                  <a:schemeClr val="tx1"/>
+                </a:solidFill>
+                <a:latin typeface="Times" charset="0"/>
+                <a:ea typeface="ＭＳ Ｐゴシック" charset="0"/>
+              </a:defRPr>
+            </a:lvl8pPr>
+            <a:lvl9pPr marL="3886200" indent="-228600" eaLnBrk="0" fontAlgn="base" hangingPunct="0">
+              <a:spcBef>
+                <a:spcPct val="0"/>
+              </a:spcBef>
+              <a:spcAft>
+                <a:spcPct val="0"/>
+              </a:spcAft>
+              <a:defRPr sz="2400">
+                <a:solidFill>
+                  <a:schemeClr val="tx1"/>
+                </a:solidFill>
+                <a:latin typeface="Times" charset="0"/>
+                <a:ea typeface="ＭＳ Ｐゴシック" charset="0"/>
+              </a:defRPr>
+            </a:lvl9pPr>
+          </a:lstStyle>
+          <a:p>
+            <a:pPr>
+              <a:spcBef>
+                <a:spcPct val="50000"/>
+              </a:spcBef>
+            </a:pPr>
+            <a:r>
+              <a:rPr lang="en-US" sz="1800" b="1">
+                <a:solidFill>
+                  <a:srgbClr val="000099"/>
+                </a:solidFill>
+                <a:latin typeface="Arial" charset="0"/>
+              </a:rPr>
+              <a:t>Processing power: Moore</a:t>
+            </a:r>
+            <a:r>
+              <a:rPr lang="ja-JP" altLang="en-US" sz="1800" b="1">
+                <a:solidFill>
+                  <a:srgbClr val="000099"/>
+                </a:solidFill>
+                <a:latin typeface="Arial" charset="0"/>
+              </a:rPr>
+              <a:t>’</a:t>
+            </a:r>
+            <a:r>
+              <a:rPr lang="en-US" altLang="ja-JP" sz="1800" b="1">
+                <a:solidFill>
+                  <a:srgbClr val="000099"/>
+                </a:solidFill>
+                <a:latin typeface="Arial" charset="0"/>
+              </a:rPr>
+              <a:t>s Law</a:t>
+            </a:r>
+            <a:endParaRPr lang="en-US" b="1">
+              <a:latin typeface="Times New Roman" charset="0"/>
+            </a:endParaRPr>
+          </a:p>
+        </p:txBody>
+      </p:sp>
+      <p:sp>
+        <p:nvSpPr>
+          <p:cNvPr id="20486" name="Text Box 4"/>
+          <p:cNvSpPr txBox="1">
+            <a:spLocks noChangeArrowheads="1"/>
+          </p:cNvSpPr>
+          <p:nvPr/>
+        </p:nvSpPr>
+        <p:spPr bwMode="auto">
+          <a:xfrm>
+            <a:off x="6959600" y="2533691"/>
+            <a:ext cx="2497138" cy="641350"/>
+          </a:xfrm>
+          <a:prstGeom prst="rect">
+            <a:avLst/>
+          </a:prstGeom>
+          <a:noFill/>
+          <a:ln>
+            <a:noFill/>
+          </a:ln>
+          <a:extLst>
+            <a:ext uri="{909E8E84-426E-40dd-AFC4-6F175D3DCCD1}">
+              <a14:hiddenFill xmlns:a14="http://schemas.microsoft.com/office/drawing/2010/main">
+                <a:solidFill>
+                  <a:srgbClr val="FFFFFF"/>
+                </a:solidFill>
+              </a14:hiddenFill>
+            </a:ext>
+            <a:ext uri="{91240B29-F687-4f45-9708-019B960494DF}">
+              <a14:hiddenLine xmlns:a14="http://schemas.microsoft.com/office/drawing/2010/main" w="9525">
+                <a:solidFill>
+                  <a:srgbClr val="000000"/>
+                </a:solidFill>
+                <a:miter lim="800000"/>
+                <a:headEnd/>
+                <a:tailEnd/>
+              </a14:hiddenLine>
+            </a:ext>
+          </a:extLst>
+        </p:spPr>
+        <p:txBody>
+          <a:bodyPr>
+            <a:spAutoFit/>
+          </a:bodyPr>
+          <a:lstStyle>
+            <a:lvl1pPr>
+              <a:defRPr sz="2400">
+                <a:solidFill>
+                  <a:schemeClr val="tx1"/>
+                </a:solidFill>
+                <a:latin typeface="Times" charset="0"/>
+                <a:ea typeface="ＭＳ Ｐゴシック" charset="0"/>
+                <a:cs typeface="ＭＳ Ｐゴシック" charset="0"/>
+              </a:defRPr>
+            </a:lvl1pPr>
+            <a:lvl2pPr marL="742950" indent="-285750">
+              <a:defRPr sz="2400">
+                <a:solidFill>
+                  <a:schemeClr val="tx1"/>
+                </a:solidFill>
+                <a:latin typeface="Times" charset="0"/>
+                <a:ea typeface="ＭＳ Ｐゴシック" charset="0"/>
+              </a:defRPr>
+            </a:lvl2pPr>
+            <a:lvl3pPr marL="1143000" indent="-228600">
+              <a:defRPr sz="2400">
+                <a:solidFill>
+                  <a:schemeClr val="tx1"/>
+                </a:solidFill>
+                <a:latin typeface="Times" charset="0"/>
+                <a:ea typeface="ＭＳ Ｐゴシック" charset="0"/>
+              </a:defRPr>
+            </a:lvl3pPr>
+            <a:lvl4pPr marL="1600200" indent="-228600">
+              <a:defRPr sz="2400">
+                <a:solidFill>
+                  <a:schemeClr val="tx1"/>
+                </a:solidFill>
+                <a:latin typeface="Times" charset="0"/>
+                <a:ea typeface="ＭＳ Ｐゴシック" charset="0"/>
+              </a:defRPr>
+            </a:lvl4pPr>
+            <a:lvl5pPr marL="2057400" indent="-228600">
+              <a:defRPr sz="2400">
+                <a:solidFill>
+                  <a:schemeClr val="tx1"/>
+                </a:solidFill>
+                <a:latin typeface="Times" charset="0"/>
+                <a:ea typeface="ＭＳ Ｐゴシック" charset="0"/>
+              </a:defRPr>
+            </a:lvl5pPr>
+            <a:lvl6pPr marL="2514600" indent="-228600" eaLnBrk="0" fontAlgn="base" hangingPunct="0">
+              <a:spcBef>
+                <a:spcPct val="0"/>
+              </a:spcBef>
+              <a:spcAft>
+                <a:spcPct val="0"/>
+              </a:spcAft>
+              <a:defRPr sz="2400">
+                <a:solidFill>
+                  <a:schemeClr val="tx1"/>
+                </a:solidFill>
+                <a:latin typeface="Times" charset="0"/>
+                <a:ea typeface="ＭＳ Ｐゴシック" charset="0"/>
+              </a:defRPr>
+            </a:lvl6pPr>
+            <a:lvl7pPr marL="2971800" indent="-228600" eaLnBrk="0" fontAlgn="base" hangingPunct="0">
+              <a:spcBef>
+                <a:spcPct val="0"/>
+              </a:spcBef>
+              <a:spcAft>
+                <a:spcPct val="0"/>
+              </a:spcAft>
+              <a:defRPr sz="2400">
+                <a:solidFill>
+                  <a:schemeClr val="tx1"/>
+                </a:solidFill>
+                <a:latin typeface="Times" charset="0"/>
+                <a:ea typeface="ＭＳ Ｐゴシック" charset="0"/>
+              </a:defRPr>
+            </a:lvl7pPr>
+            <a:lvl8pPr marL="3429000" indent="-228600" eaLnBrk="0" fontAlgn="base" hangingPunct="0">
+              <a:spcBef>
+                <a:spcPct val="0"/>
+              </a:spcBef>
+              <a:spcAft>
+                <a:spcPct val="0"/>
+              </a:spcAft>
+              <a:defRPr sz="2400">
+                <a:solidFill>
+                  <a:schemeClr val="tx1"/>
+                </a:solidFill>
+                <a:latin typeface="Times" charset="0"/>
+                <a:ea typeface="ＭＳ Ｐゴシック" charset="0"/>
+              </a:defRPr>
+            </a:lvl8pPr>
+            <a:lvl9pPr marL="3886200" indent="-228600" eaLnBrk="0" fontAlgn="base" hangingPunct="0">
+              <a:spcBef>
+                <a:spcPct val="0"/>
+              </a:spcBef>
+              <a:spcAft>
+                <a:spcPct val="0"/>
+              </a:spcAft>
+              <a:defRPr sz="2400">
+                <a:solidFill>
+                  <a:schemeClr val="tx1"/>
+                </a:solidFill>
+                <a:latin typeface="Times" charset="0"/>
+                <a:ea typeface="ＭＳ Ｐゴシック" charset="0"/>
+              </a:defRPr>
+            </a:lvl9pPr>
+          </a:lstStyle>
+          <a:p>
+            <a:pPr>
+              <a:spcBef>
+                <a:spcPct val="50000"/>
+              </a:spcBef>
+            </a:pPr>
+            <a:r>
+              <a:rPr lang="en-US" sz="1800" b="1">
+                <a:solidFill>
+                  <a:srgbClr val="FF00FF"/>
+                </a:solidFill>
+                <a:latin typeface="Arial" charset="0"/>
+              </a:rPr>
+              <a:t>Amount of data in the world</a:t>
+            </a:r>
+            <a:endParaRPr lang="en-US">
+              <a:latin typeface="Times New Roman" charset="0"/>
+            </a:endParaRPr>
+          </a:p>
+        </p:txBody>
+      </p:sp>
+    </p:spTree>
+    <p:extLst>
+      <p:ext uri="{BB962C8B-B14F-4D97-AF65-F5344CB8AC3E}">
+        <p14:creationId xmlns:p14="http://schemas.microsoft.com/office/powerpoint/2010/main" val="2025287397"/>
+      </p:ext>
+    </p:extLst>
+  </p:cSld>
+  <p:clrMapOvr>
+    <a:masterClrMapping/>
+  </p:clrMapOvr>
+  <mc:AlternateContent xmlns:mc="http://schemas.openxmlformats.org/markup-compatibility/2006" xmlns:p14="http://schemas.microsoft.com/office/powerpoint/2010/main">
+    <mc:Choice Requires="p14">
+      <p:transition spd="slow" p14:dur="2000"/>
+    </mc:Choice>
+    <mc:Fallback xmlns="">
+      <p:transition xmlns:p14="http://schemas.microsoft.com/office/powerpoint/2010/main" spd="slow"/>
+    </mc:Fallback>
+  </mc:AlternateContent>
+  <p:timing>
+    <p:tnLst>
+      <p:par>
+        <p:cTn xmlns:p14="http://schemas.microsoft.com/office/powerpoint/2010/main" id="1" dur="indefinite" restart="never" nodeType="tmRoot"/>
+      </p:par>
+    </p:tnLst>
+  </p:timing>
+</p:sld>
+</file>
+
+<file path=ppt/slides/slide21.xml><?xml version="1.0" encoding="utf-8"?>
+<p:sld xmlns:a="http://schemas.openxmlformats.org/drawingml/2006/main" xmlns:r="http://schemas.openxmlformats.org/officeDocument/2006/relationships" xmlns:p="http://schemas.openxmlformats.org/presentationml/2006/main">
+  <p:cSld>
+    <p:spTree>
+      <p:nvGrpSpPr>
+        <p:cNvPr id="1" name=""/>
+        <p:cNvGrpSpPr/>
+        <p:nvPr/>
+      </p:nvGrpSpPr>
+      <p:grpSpPr>
+        <a:xfrm>
+          <a:off x="0" y="0"/>
+          <a:ext cx="0" cy="0"/>
+          <a:chOff x="0" y="0"/>
+          <a:chExt cx="0" cy="0"/>
+        </a:xfrm>
+      </p:grpSpPr>
+      <p:graphicFrame>
+        <p:nvGraphicFramePr>
+          <p:cNvPr id="24577" name="Object 4"/>
+          <p:cNvGraphicFramePr>
+            <a:graphicFrameLocks noChangeAspect="1"/>
+          </p:cNvGraphicFramePr>
+          <p:nvPr>
+            <p:extLst>
+              <p:ext uri="{D42A27DB-BD31-4B8C-83A1-F6EECF244321}">
+                <p14:modId xmlns:p14="http://schemas.microsoft.com/office/powerpoint/2010/main" val="1638542525"/>
+              </p:ext>
+            </p:extLst>
+          </p:nvPr>
+        </p:nvGraphicFramePr>
+        <p:xfrm>
+          <a:off x="1175285" y="1616075"/>
+          <a:ext cx="6063715" cy="4104254"/>
+        </p:xfrm>
+        <a:graphic>
+          <a:graphicData uri="http://schemas.openxmlformats.org/presentationml/2006/ole">
+            <mc:AlternateContent xmlns:mc="http://schemas.openxmlformats.org/markup-compatibility/2006">
+              <mc:Choice xmlns:v="urn:schemas-microsoft-com:vml" Requires="v">
+                <p:oleObj spid="_x0000_s2049" name="Worksheet" r:id="rId4" imgW="6896100" imgH="5499100" progId="Excel.Sheet.8">
+                  <p:embed/>
+                </p:oleObj>
+              </mc:Choice>
+              <mc:Fallback>
+                <p:oleObj name="Worksheet" r:id="rId4" imgW="6896100" imgH="5499100" progId="Excel.Sheet.8">
+                  <p:embed/>
+                  <p:pic>
+                    <p:nvPicPr>
+                      <p:cNvPr id="0" name=""/>
+                      <p:cNvPicPr>
+                        <a:picLocks noChangeAspect="1" noChangeArrowheads="1"/>
+                      </p:cNvPicPr>
+                      <p:nvPr/>
+                    </p:nvPicPr>
+                    <p:blipFill>
+                      <a:blip r:embed="rId5">
+                        <a:extLst>
+                          <a:ext uri="{28A0092B-C50C-407E-A947-70E740481C1C}">
+                            <a14:useLocalDpi xmlns:a14="http://schemas.microsoft.com/office/drawing/2010/main" val="0"/>
+                          </a:ext>
+                        </a:extLst>
+                      </a:blip>
+                      <a:srcRect/>
+                      <a:stretch>
+                        <a:fillRect/>
+                      </a:stretch>
+                    </p:blipFill>
+                    <p:spPr bwMode="auto">
+                      <a:xfrm>
+                        <a:off x="1175285" y="1616075"/>
+                        <a:ext cx="6063715" cy="4104254"/>
+                      </a:xfrm>
+                      <a:prstGeom prst="rect">
+                        <a:avLst/>
+                      </a:prstGeom>
+                      <a:noFill/>
+                      <a:ln>
+                        <a:noFill/>
+                      </a:ln>
+                      <a:effectLst/>
+                      <a:extLst/>
+                    </p:spPr>
+                  </p:pic>
+                </p:oleObj>
+              </mc:Fallback>
+            </mc:AlternateContent>
+          </a:graphicData>
+        </a:graphic>
+      </p:graphicFrame>
+      <p:sp>
+        <p:nvSpPr>
+          <p:cNvPr id="24578" name="Rectangle 5"/>
+          <p:cNvSpPr>
+            <a:spLocks noGrp="1" noChangeArrowheads="1"/>
+          </p:cNvSpPr>
+          <p:nvPr>
+            <p:ph type="title"/>
+          </p:nvPr>
+        </p:nvSpPr>
+        <p:spPr>
+          <a:xfrm>
+            <a:off x="780434" y="431800"/>
+            <a:ext cx="8060267" cy="863600"/>
+          </a:xfrm>
+        </p:spPr>
+        <p:txBody>
+          <a:bodyPr>
+            <a:normAutofit fontScale="90000"/>
+          </a:bodyPr>
+          <a:lstStyle/>
+          <a:p>
+            <a:pPr algn="l" eaLnBrk="1" hangingPunct="1"/>
+            <a:r>
+              <a:rPr lang="en-US" sz="2900" dirty="0">
+                <a:latin typeface="Arial" charset="0"/>
+              </a:rPr>
+              <a:t/>
+            </a:r>
+            <a:br>
+              <a:rPr lang="en-US" sz="2900" dirty="0">
+                <a:latin typeface="Arial" charset="0"/>
+              </a:rPr>
+            </a:br>
+            <a:r>
+              <a:rPr lang="en-US" sz="2500" dirty="0">
+                <a:latin typeface="Arial" charset="0"/>
+              </a:rPr>
+              <a:t>What is the rate-limiting step in data understanding?</a:t>
+            </a:r>
+          </a:p>
+        </p:txBody>
+      </p:sp>
+      <p:sp>
+        <p:nvSpPr>
+          <p:cNvPr id="24579" name="Text Box 6"/>
+          <p:cNvSpPr txBox="1">
+            <a:spLocks noChangeArrowheads="1"/>
+          </p:cNvSpPr>
+          <p:nvPr/>
+        </p:nvSpPr>
+        <p:spPr bwMode="auto">
+          <a:xfrm>
+            <a:off x="4387850" y="2079625"/>
+            <a:ext cx="2236788" cy="641350"/>
+          </a:xfrm>
+          <a:prstGeom prst="rect">
+            <a:avLst/>
+          </a:prstGeom>
+          <a:noFill/>
+          <a:ln>
+            <a:noFill/>
+          </a:ln>
+          <a:extLst>
+            <a:ext uri="{909E8E84-426E-40dd-AFC4-6F175D3DCCD1}">
+              <a14:hiddenFill xmlns:a14="http://schemas.microsoft.com/office/drawing/2010/main">
+                <a:solidFill>
+                  <a:srgbClr val="FFFFFF"/>
+                </a:solidFill>
+              </a14:hiddenFill>
+            </a:ext>
+            <a:ext uri="{91240B29-F687-4f45-9708-019B960494DF}">
+              <a14:hiddenLine xmlns:a14="http://schemas.microsoft.com/office/drawing/2010/main" w="9525">
+                <a:solidFill>
+                  <a:srgbClr val="000000"/>
+                </a:solidFill>
+                <a:miter lim="800000"/>
+                <a:headEnd/>
+                <a:tailEnd/>
+              </a14:hiddenLine>
+            </a:ext>
+          </a:extLst>
+        </p:spPr>
+        <p:txBody>
+          <a:bodyPr>
+            <a:spAutoFit/>
+          </a:bodyPr>
+          <a:lstStyle>
+            <a:lvl1pPr>
+              <a:defRPr sz="2400">
+                <a:solidFill>
+                  <a:schemeClr val="tx1"/>
+                </a:solidFill>
+                <a:latin typeface="Times" charset="0"/>
+                <a:ea typeface="ＭＳ Ｐゴシック" charset="0"/>
+                <a:cs typeface="ＭＳ Ｐゴシック" charset="0"/>
+              </a:defRPr>
+            </a:lvl1pPr>
+            <a:lvl2pPr marL="742950" indent="-285750">
+              <a:defRPr sz="2400">
+                <a:solidFill>
+                  <a:schemeClr val="tx1"/>
+                </a:solidFill>
+                <a:latin typeface="Times" charset="0"/>
+                <a:ea typeface="ＭＳ Ｐゴシック" charset="0"/>
+              </a:defRPr>
+            </a:lvl2pPr>
+            <a:lvl3pPr marL="1143000" indent="-228600">
+              <a:defRPr sz="2400">
+                <a:solidFill>
+                  <a:schemeClr val="tx1"/>
+                </a:solidFill>
+                <a:latin typeface="Times" charset="0"/>
+                <a:ea typeface="ＭＳ Ｐゴシック" charset="0"/>
+              </a:defRPr>
+            </a:lvl3pPr>
+            <a:lvl4pPr marL="1600200" indent="-228600">
+              <a:defRPr sz="2400">
+                <a:solidFill>
+                  <a:schemeClr val="tx1"/>
+                </a:solidFill>
+                <a:latin typeface="Times" charset="0"/>
+                <a:ea typeface="ＭＳ Ｐゴシック" charset="0"/>
+              </a:defRPr>
+            </a:lvl4pPr>
+            <a:lvl5pPr marL="2057400" indent="-228600">
+              <a:defRPr sz="2400">
+                <a:solidFill>
+                  <a:schemeClr val="tx1"/>
+                </a:solidFill>
+                <a:latin typeface="Times" charset="0"/>
+                <a:ea typeface="ＭＳ Ｐゴシック" charset="0"/>
+              </a:defRPr>
+            </a:lvl5pPr>
+            <a:lvl6pPr marL="2514600" indent="-228600" eaLnBrk="0" fontAlgn="base" hangingPunct="0">
+              <a:spcBef>
+                <a:spcPct val="0"/>
+              </a:spcBef>
+              <a:spcAft>
+                <a:spcPct val="0"/>
+              </a:spcAft>
+              <a:defRPr sz="2400">
+                <a:solidFill>
+                  <a:schemeClr val="tx1"/>
+                </a:solidFill>
+                <a:latin typeface="Times" charset="0"/>
+                <a:ea typeface="ＭＳ Ｐゴシック" charset="0"/>
+              </a:defRPr>
+            </a:lvl6pPr>
+            <a:lvl7pPr marL="2971800" indent="-228600" eaLnBrk="0" fontAlgn="base" hangingPunct="0">
+              <a:spcBef>
+                <a:spcPct val="0"/>
+              </a:spcBef>
+              <a:spcAft>
+                <a:spcPct val="0"/>
+              </a:spcAft>
+              <a:defRPr sz="2400">
+                <a:solidFill>
+                  <a:schemeClr val="tx1"/>
+                </a:solidFill>
+                <a:latin typeface="Times" charset="0"/>
+                <a:ea typeface="ＭＳ Ｐゴシック" charset="0"/>
+              </a:defRPr>
+            </a:lvl7pPr>
+            <a:lvl8pPr marL="3429000" indent="-228600" eaLnBrk="0" fontAlgn="base" hangingPunct="0">
+              <a:spcBef>
+                <a:spcPct val="0"/>
+              </a:spcBef>
+              <a:spcAft>
+                <a:spcPct val="0"/>
+              </a:spcAft>
+              <a:defRPr sz="2400">
+                <a:solidFill>
+                  <a:schemeClr val="tx1"/>
+                </a:solidFill>
+                <a:latin typeface="Times" charset="0"/>
+                <a:ea typeface="ＭＳ Ｐゴシック" charset="0"/>
+              </a:defRPr>
+            </a:lvl8pPr>
+            <a:lvl9pPr marL="3886200" indent="-228600" eaLnBrk="0" fontAlgn="base" hangingPunct="0">
+              <a:spcBef>
+                <a:spcPct val="0"/>
+              </a:spcBef>
+              <a:spcAft>
+                <a:spcPct val="0"/>
+              </a:spcAft>
+              <a:defRPr sz="2400">
+                <a:solidFill>
+                  <a:schemeClr val="tx1"/>
+                </a:solidFill>
+                <a:latin typeface="Times" charset="0"/>
+                <a:ea typeface="ＭＳ Ｐゴシック" charset="0"/>
+              </a:defRPr>
+            </a:lvl9pPr>
+          </a:lstStyle>
+          <a:p>
+            <a:pPr>
+              <a:spcBef>
+                <a:spcPct val="50000"/>
+              </a:spcBef>
+            </a:pPr>
+            <a:r>
+              <a:rPr lang="en-US" sz="1800" b="1">
+                <a:solidFill>
+                  <a:srgbClr val="000099"/>
+                </a:solidFill>
+                <a:latin typeface="Arial" charset="0"/>
+              </a:rPr>
+              <a:t>Processing power: Moore</a:t>
+            </a:r>
+            <a:r>
+              <a:rPr lang="ja-JP" altLang="en-US" sz="1800" b="1">
+                <a:solidFill>
+                  <a:srgbClr val="000099"/>
+                </a:solidFill>
+                <a:latin typeface="Arial" charset="0"/>
+              </a:rPr>
+              <a:t>’</a:t>
+            </a:r>
+            <a:r>
+              <a:rPr lang="en-US" altLang="ja-JP" sz="1800" b="1">
+                <a:solidFill>
+                  <a:srgbClr val="000099"/>
+                </a:solidFill>
+                <a:latin typeface="Arial" charset="0"/>
+              </a:rPr>
+              <a:t>s Law</a:t>
+            </a:r>
+            <a:endParaRPr lang="en-US" b="1">
+              <a:latin typeface="Times New Roman" charset="0"/>
+            </a:endParaRPr>
+          </a:p>
+        </p:txBody>
+      </p:sp>
+      <p:sp>
+        <p:nvSpPr>
+          <p:cNvPr id="24580" name="Text Box 7"/>
+          <p:cNvSpPr txBox="1">
+            <a:spLocks noChangeArrowheads="1"/>
+          </p:cNvSpPr>
+          <p:nvPr/>
+        </p:nvSpPr>
+        <p:spPr bwMode="auto">
+          <a:xfrm>
+            <a:off x="2481263" y="4041775"/>
+            <a:ext cx="3505200" cy="366713"/>
+          </a:xfrm>
+          <a:prstGeom prst="rect">
+            <a:avLst/>
+          </a:prstGeom>
+          <a:noFill/>
+          <a:ln>
+            <a:noFill/>
+          </a:ln>
+          <a:extLst>
+            <a:ext uri="{909E8E84-426E-40dd-AFC4-6F175D3DCCD1}">
+              <a14:hiddenFill xmlns:a14="http://schemas.microsoft.com/office/drawing/2010/main">
+                <a:solidFill>
+                  <a:srgbClr val="FFFFFF"/>
+                </a:solidFill>
+              </a14:hiddenFill>
+            </a:ext>
+            <a:ext uri="{91240B29-F687-4f45-9708-019B960494DF}">
+              <a14:hiddenLine xmlns:a14="http://schemas.microsoft.com/office/drawing/2010/main" w="9525">
+                <a:solidFill>
+                  <a:srgbClr val="000000"/>
+                </a:solidFill>
+                <a:miter lim="800000"/>
+                <a:headEnd/>
+                <a:tailEnd/>
+              </a14:hiddenLine>
+            </a:ext>
+          </a:extLst>
+        </p:spPr>
+        <p:txBody>
+          <a:bodyPr>
+            <a:spAutoFit/>
+          </a:bodyPr>
+          <a:lstStyle>
+            <a:lvl1pPr>
+              <a:defRPr sz="2400">
+                <a:solidFill>
+                  <a:schemeClr val="tx1"/>
+                </a:solidFill>
+                <a:latin typeface="Times" charset="0"/>
+                <a:ea typeface="ＭＳ Ｐゴシック" charset="0"/>
+                <a:cs typeface="ＭＳ Ｐゴシック" charset="0"/>
+              </a:defRPr>
+            </a:lvl1pPr>
+            <a:lvl2pPr marL="742950" indent="-285750">
+              <a:defRPr sz="2400">
+                <a:solidFill>
+                  <a:schemeClr val="tx1"/>
+                </a:solidFill>
+                <a:latin typeface="Times" charset="0"/>
+                <a:ea typeface="ＭＳ Ｐゴシック" charset="0"/>
+              </a:defRPr>
+            </a:lvl2pPr>
+            <a:lvl3pPr marL="1143000" indent="-228600">
+              <a:defRPr sz="2400">
+                <a:solidFill>
+                  <a:schemeClr val="tx1"/>
+                </a:solidFill>
+                <a:latin typeface="Times" charset="0"/>
+                <a:ea typeface="ＭＳ Ｐゴシック" charset="0"/>
+              </a:defRPr>
+            </a:lvl3pPr>
+            <a:lvl4pPr marL="1600200" indent="-228600">
+              <a:defRPr sz="2400">
+                <a:solidFill>
+                  <a:schemeClr val="tx1"/>
+                </a:solidFill>
+                <a:latin typeface="Times" charset="0"/>
+                <a:ea typeface="ＭＳ Ｐゴシック" charset="0"/>
+              </a:defRPr>
+            </a:lvl4pPr>
+            <a:lvl5pPr marL="2057400" indent="-228600">
+              <a:defRPr sz="2400">
+                <a:solidFill>
+                  <a:schemeClr val="tx1"/>
+                </a:solidFill>
+                <a:latin typeface="Times" charset="0"/>
+                <a:ea typeface="ＭＳ Ｐゴシック" charset="0"/>
+              </a:defRPr>
+            </a:lvl5pPr>
+            <a:lvl6pPr marL="2514600" indent="-228600" eaLnBrk="0" fontAlgn="base" hangingPunct="0">
+              <a:spcBef>
+                <a:spcPct val="0"/>
+              </a:spcBef>
+              <a:spcAft>
+                <a:spcPct val="0"/>
+              </a:spcAft>
+              <a:defRPr sz="2400">
+                <a:solidFill>
+                  <a:schemeClr val="tx1"/>
+                </a:solidFill>
+                <a:latin typeface="Times" charset="0"/>
+                <a:ea typeface="ＭＳ Ｐゴシック" charset="0"/>
+              </a:defRPr>
+            </a:lvl6pPr>
+            <a:lvl7pPr marL="2971800" indent="-228600" eaLnBrk="0" fontAlgn="base" hangingPunct="0">
+              <a:spcBef>
+                <a:spcPct val="0"/>
+              </a:spcBef>
+              <a:spcAft>
+                <a:spcPct val="0"/>
+              </a:spcAft>
+              <a:defRPr sz="2400">
+                <a:solidFill>
+                  <a:schemeClr val="tx1"/>
+                </a:solidFill>
+                <a:latin typeface="Times" charset="0"/>
+                <a:ea typeface="ＭＳ Ｐゴシック" charset="0"/>
+              </a:defRPr>
+            </a:lvl7pPr>
+            <a:lvl8pPr marL="3429000" indent="-228600" eaLnBrk="0" fontAlgn="base" hangingPunct="0">
+              <a:spcBef>
+                <a:spcPct val="0"/>
+              </a:spcBef>
+              <a:spcAft>
+                <a:spcPct val="0"/>
+              </a:spcAft>
+              <a:defRPr sz="2400">
+                <a:solidFill>
+                  <a:schemeClr val="tx1"/>
+                </a:solidFill>
+                <a:latin typeface="Times" charset="0"/>
+                <a:ea typeface="ＭＳ Ｐゴシック" charset="0"/>
+              </a:defRPr>
+            </a:lvl8pPr>
+            <a:lvl9pPr marL="3886200" indent="-228600" eaLnBrk="0" fontAlgn="base" hangingPunct="0">
+              <a:spcBef>
+                <a:spcPct val="0"/>
+              </a:spcBef>
+              <a:spcAft>
+                <a:spcPct val="0"/>
+              </a:spcAft>
+              <a:defRPr sz="2400">
+                <a:solidFill>
+                  <a:schemeClr val="tx1"/>
+                </a:solidFill>
+                <a:latin typeface="Times" charset="0"/>
+                <a:ea typeface="ＭＳ Ｐゴシック" charset="0"/>
+              </a:defRPr>
+            </a:lvl9pPr>
+          </a:lstStyle>
+          <a:p>
+            <a:pPr>
+              <a:spcBef>
+                <a:spcPct val="50000"/>
+              </a:spcBef>
+            </a:pPr>
+            <a:r>
+              <a:rPr lang="en-US" sz="1800" b="1">
+                <a:solidFill>
+                  <a:srgbClr val="006600"/>
+                </a:solidFill>
+                <a:latin typeface="Arial" charset="0"/>
+              </a:rPr>
+              <a:t>Human cognitive capacity</a:t>
+            </a:r>
+            <a:endParaRPr lang="en-US">
+              <a:latin typeface="Times New Roman" charset="0"/>
+            </a:endParaRPr>
+          </a:p>
+        </p:txBody>
+      </p:sp>
+      <p:sp>
+        <p:nvSpPr>
+          <p:cNvPr id="24581" name="Text Box 8"/>
+          <p:cNvSpPr txBox="1">
+            <a:spLocks noChangeArrowheads="1"/>
+          </p:cNvSpPr>
+          <p:nvPr/>
+        </p:nvSpPr>
+        <p:spPr bwMode="auto">
+          <a:xfrm>
+            <a:off x="1787589" y="5523649"/>
+            <a:ext cx="6597492" cy="369332"/>
+          </a:xfrm>
+          <a:prstGeom prst="rect">
+            <a:avLst/>
+          </a:prstGeom>
+          <a:noFill/>
+          <a:ln>
+            <a:noFill/>
+          </a:ln>
+          <a:extLst>
+            <a:ext uri="{909E8E84-426E-40dd-AFC4-6F175D3DCCD1}">
+              <a14:hiddenFill xmlns:a14="http://schemas.microsoft.com/office/drawing/2010/main">
+                <a:solidFill>
+                  <a:srgbClr val="FFFFFF"/>
+                </a:solidFill>
+              </a14:hiddenFill>
+            </a:ext>
+            <a:ext uri="{91240B29-F687-4f45-9708-019B960494DF}">
+              <a14:hiddenLine xmlns:a14="http://schemas.microsoft.com/office/drawing/2010/main" w="9525">
+                <a:solidFill>
+                  <a:srgbClr val="000000"/>
+                </a:solidFill>
+                <a:miter lim="800000"/>
+                <a:headEnd/>
+                <a:tailEnd/>
+              </a14:hiddenLine>
+            </a:ext>
+          </a:extLst>
+        </p:spPr>
+        <p:txBody>
+          <a:bodyPr wrap="square">
+            <a:spAutoFit/>
+          </a:bodyPr>
+          <a:lstStyle>
+            <a:lvl1pPr>
+              <a:defRPr sz="2400">
+                <a:solidFill>
+                  <a:schemeClr val="tx1"/>
+                </a:solidFill>
+                <a:latin typeface="Times" charset="0"/>
+                <a:ea typeface="ＭＳ Ｐゴシック" charset="0"/>
+                <a:cs typeface="ＭＳ Ｐゴシック" charset="0"/>
+              </a:defRPr>
+            </a:lvl1pPr>
+            <a:lvl2pPr marL="742950" indent="-285750">
+              <a:defRPr sz="2400">
+                <a:solidFill>
+                  <a:schemeClr val="tx1"/>
+                </a:solidFill>
+                <a:latin typeface="Times" charset="0"/>
+                <a:ea typeface="ＭＳ Ｐゴシック" charset="0"/>
+              </a:defRPr>
+            </a:lvl2pPr>
+            <a:lvl3pPr marL="1143000" indent="-228600">
+              <a:defRPr sz="2400">
+                <a:solidFill>
+                  <a:schemeClr val="tx1"/>
+                </a:solidFill>
+                <a:latin typeface="Times" charset="0"/>
+                <a:ea typeface="ＭＳ Ｐゴシック" charset="0"/>
+              </a:defRPr>
+            </a:lvl3pPr>
+            <a:lvl4pPr marL="1600200" indent="-228600">
+              <a:defRPr sz="2400">
+                <a:solidFill>
+                  <a:schemeClr val="tx1"/>
+                </a:solidFill>
+                <a:latin typeface="Times" charset="0"/>
+                <a:ea typeface="ＭＳ Ｐゴシック" charset="0"/>
+              </a:defRPr>
+            </a:lvl4pPr>
+            <a:lvl5pPr marL="2057400" indent="-228600">
+              <a:defRPr sz="2400">
+                <a:solidFill>
+                  <a:schemeClr val="tx1"/>
+                </a:solidFill>
+                <a:latin typeface="Times" charset="0"/>
+                <a:ea typeface="ＭＳ Ｐゴシック" charset="0"/>
+              </a:defRPr>
+            </a:lvl5pPr>
+            <a:lvl6pPr marL="2514600" indent="-228600" eaLnBrk="0" fontAlgn="base" hangingPunct="0">
+              <a:spcBef>
+                <a:spcPct val="0"/>
+              </a:spcBef>
+              <a:spcAft>
+                <a:spcPct val="0"/>
+              </a:spcAft>
+              <a:defRPr sz="2400">
+                <a:solidFill>
+                  <a:schemeClr val="tx1"/>
+                </a:solidFill>
+                <a:latin typeface="Times" charset="0"/>
+                <a:ea typeface="ＭＳ Ｐゴシック" charset="0"/>
+              </a:defRPr>
+            </a:lvl6pPr>
+            <a:lvl7pPr marL="2971800" indent="-228600" eaLnBrk="0" fontAlgn="base" hangingPunct="0">
+              <a:spcBef>
+                <a:spcPct val="0"/>
+              </a:spcBef>
+              <a:spcAft>
+                <a:spcPct val="0"/>
+              </a:spcAft>
+              <a:defRPr sz="2400">
+                <a:solidFill>
+                  <a:schemeClr val="tx1"/>
+                </a:solidFill>
+                <a:latin typeface="Times" charset="0"/>
+                <a:ea typeface="ＭＳ Ｐゴシック" charset="0"/>
+              </a:defRPr>
+            </a:lvl7pPr>
+            <a:lvl8pPr marL="3429000" indent="-228600" eaLnBrk="0" fontAlgn="base" hangingPunct="0">
+              <a:spcBef>
+                <a:spcPct val="0"/>
+              </a:spcBef>
+              <a:spcAft>
+                <a:spcPct val="0"/>
+              </a:spcAft>
+              <a:defRPr sz="2400">
+                <a:solidFill>
+                  <a:schemeClr val="tx1"/>
+                </a:solidFill>
+                <a:latin typeface="Times" charset="0"/>
+                <a:ea typeface="ＭＳ Ｐゴシック" charset="0"/>
+              </a:defRPr>
+            </a:lvl8pPr>
+            <a:lvl9pPr marL="3886200" indent="-228600" eaLnBrk="0" fontAlgn="base" hangingPunct="0">
+              <a:spcBef>
+                <a:spcPct val="0"/>
+              </a:spcBef>
+              <a:spcAft>
+                <a:spcPct val="0"/>
+              </a:spcAft>
+              <a:defRPr sz="2400">
+                <a:solidFill>
+                  <a:schemeClr val="tx1"/>
+                </a:solidFill>
+                <a:latin typeface="Times" charset="0"/>
+                <a:ea typeface="ＭＳ Ｐゴシック" charset="0"/>
+              </a:defRPr>
+            </a:lvl9pPr>
+          </a:lstStyle>
+          <a:p>
+            <a:pPr>
+              <a:spcBef>
+                <a:spcPct val="50000"/>
+              </a:spcBef>
+            </a:pPr>
+            <a:r>
+              <a:rPr lang="en-US" sz="1800">
+                <a:solidFill>
+                  <a:srgbClr val="000099"/>
+                </a:solidFill>
+                <a:latin typeface="Arial" charset="0"/>
+              </a:rPr>
+              <a:t>Idea adapted from </a:t>
+            </a:r>
+            <a:r>
+              <a:rPr lang="ja-JP" altLang="en-US" sz="1800">
+                <a:solidFill>
+                  <a:srgbClr val="000099"/>
+                </a:solidFill>
+                <a:latin typeface="Arial" charset="0"/>
+              </a:rPr>
+              <a:t>“</a:t>
+            </a:r>
+            <a:r>
+              <a:rPr lang="en-US" altLang="ja-JP" sz="1800">
+                <a:solidFill>
+                  <a:srgbClr val="000099"/>
+                </a:solidFill>
+                <a:latin typeface="Arial" charset="0"/>
+              </a:rPr>
+              <a:t>Less is More</a:t>
+            </a:r>
+            <a:r>
+              <a:rPr lang="ja-JP" altLang="en-US" sz="1800">
+                <a:solidFill>
+                  <a:srgbClr val="000099"/>
+                </a:solidFill>
+                <a:latin typeface="Arial" charset="0"/>
+              </a:rPr>
+              <a:t>”</a:t>
+            </a:r>
+            <a:r>
+              <a:rPr lang="en-US" altLang="ja-JP" sz="1800">
+                <a:solidFill>
+                  <a:srgbClr val="000099"/>
+                </a:solidFill>
+                <a:latin typeface="Arial" charset="0"/>
+              </a:rPr>
+              <a:t> by Bill Buxton (2001)</a:t>
+            </a:r>
+            <a:endParaRPr lang="en-US" sz="1800">
+              <a:latin typeface="Times New Roman" charset="0"/>
+            </a:endParaRPr>
+          </a:p>
+        </p:txBody>
+      </p:sp>
+      <p:sp>
+        <p:nvSpPr>
+          <p:cNvPr id="24583" name="Text Box 4"/>
+          <p:cNvSpPr txBox="1">
+            <a:spLocks noChangeArrowheads="1"/>
+          </p:cNvSpPr>
+          <p:nvPr/>
+        </p:nvSpPr>
+        <p:spPr bwMode="auto">
+          <a:xfrm>
+            <a:off x="6959600" y="1889125"/>
+            <a:ext cx="2497138" cy="641350"/>
+          </a:xfrm>
+          <a:prstGeom prst="rect">
+            <a:avLst/>
+          </a:prstGeom>
+          <a:noFill/>
+          <a:ln>
+            <a:noFill/>
+          </a:ln>
+          <a:extLst>
+            <a:ext uri="{909E8E84-426E-40dd-AFC4-6F175D3DCCD1}">
+              <a14:hiddenFill xmlns:a14="http://schemas.microsoft.com/office/drawing/2010/main">
+                <a:solidFill>
+                  <a:srgbClr val="FFFFFF"/>
+                </a:solidFill>
+              </a14:hiddenFill>
+            </a:ext>
+            <a:ext uri="{91240B29-F687-4f45-9708-019B960494DF}">
+              <a14:hiddenLine xmlns:a14="http://schemas.microsoft.com/office/drawing/2010/main" w="9525">
+                <a:solidFill>
+                  <a:srgbClr val="000000"/>
+                </a:solidFill>
+                <a:miter lim="800000"/>
+                <a:headEnd/>
+                <a:tailEnd/>
+              </a14:hiddenLine>
+            </a:ext>
+          </a:extLst>
+        </p:spPr>
+        <p:txBody>
+          <a:bodyPr>
+            <a:spAutoFit/>
+          </a:bodyPr>
+          <a:lstStyle>
+            <a:lvl1pPr>
+              <a:defRPr sz="2400">
+                <a:solidFill>
+                  <a:schemeClr val="tx1"/>
+                </a:solidFill>
+                <a:latin typeface="Times" charset="0"/>
+                <a:ea typeface="ＭＳ Ｐゴシック" charset="0"/>
+                <a:cs typeface="ＭＳ Ｐゴシック" charset="0"/>
+              </a:defRPr>
+            </a:lvl1pPr>
+            <a:lvl2pPr marL="742950" indent="-285750">
+              <a:defRPr sz="2400">
+                <a:solidFill>
+                  <a:schemeClr val="tx1"/>
+                </a:solidFill>
+                <a:latin typeface="Times" charset="0"/>
+                <a:ea typeface="ＭＳ Ｐゴシック" charset="0"/>
+              </a:defRPr>
+            </a:lvl2pPr>
+            <a:lvl3pPr marL="1143000" indent="-228600">
+              <a:defRPr sz="2400">
+                <a:solidFill>
+                  <a:schemeClr val="tx1"/>
+                </a:solidFill>
+                <a:latin typeface="Times" charset="0"/>
+                <a:ea typeface="ＭＳ Ｐゴシック" charset="0"/>
+              </a:defRPr>
+            </a:lvl3pPr>
+            <a:lvl4pPr marL="1600200" indent="-228600">
+              <a:defRPr sz="2400">
+                <a:solidFill>
+                  <a:schemeClr val="tx1"/>
+                </a:solidFill>
+                <a:latin typeface="Times" charset="0"/>
+                <a:ea typeface="ＭＳ Ｐゴシック" charset="0"/>
+              </a:defRPr>
+            </a:lvl4pPr>
+            <a:lvl5pPr marL="2057400" indent="-228600">
+              <a:defRPr sz="2400">
+                <a:solidFill>
+                  <a:schemeClr val="tx1"/>
+                </a:solidFill>
+                <a:latin typeface="Times" charset="0"/>
+                <a:ea typeface="ＭＳ Ｐゴシック" charset="0"/>
+              </a:defRPr>
+            </a:lvl5pPr>
+            <a:lvl6pPr marL="2514600" indent="-228600" eaLnBrk="0" fontAlgn="base" hangingPunct="0">
+              <a:spcBef>
+                <a:spcPct val="0"/>
+              </a:spcBef>
+              <a:spcAft>
+                <a:spcPct val="0"/>
+              </a:spcAft>
+              <a:defRPr sz="2400">
+                <a:solidFill>
+                  <a:schemeClr val="tx1"/>
+                </a:solidFill>
+                <a:latin typeface="Times" charset="0"/>
+                <a:ea typeface="ＭＳ Ｐゴシック" charset="0"/>
+              </a:defRPr>
+            </a:lvl6pPr>
+            <a:lvl7pPr marL="2971800" indent="-228600" eaLnBrk="0" fontAlgn="base" hangingPunct="0">
+              <a:spcBef>
+                <a:spcPct val="0"/>
+              </a:spcBef>
+              <a:spcAft>
+                <a:spcPct val="0"/>
+              </a:spcAft>
+              <a:defRPr sz="2400">
+                <a:solidFill>
+                  <a:schemeClr val="tx1"/>
+                </a:solidFill>
+                <a:latin typeface="Times" charset="0"/>
+                <a:ea typeface="ＭＳ Ｐゴシック" charset="0"/>
+              </a:defRPr>
+            </a:lvl7pPr>
+            <a:lvl8pPr marL="3429000" indent="-228600" eaLnBrk="0" fontAlgn="base" hangingPunct="0">
+              <a:spcBef>
+                <a:spcPct val="0"/>
+              </a:spcBef>
+              <a:spcAft>
+                <a:spcPct val="0"/>
+              </a:spcAft>
+              <a:defRPr sz="2400">
+                <a:solidFill>
+                  <a:schemeClr val="tx1"/>
+                </a:solidFill>
+                <a:latin typeface="Times" charset="0"/>
+                <a:ea typeface="ＭＳ Ｐゴシック" charset="0"/>
+              </a:defRPr>
+            </a:lvl8pPr>
+            <a:lvl9pPr marL="3886200" indent="-228600" eaLnBrk="0" fontAlgn="base" hangingPunct="0">
+              <a:spcBef>
+                <a:spcPct val="0"/>
+              </a:spcBef>
+              <a:spcAft>
+                <a:spcPct val="0"/>
+              </a:spcAft>
+              <a:defRPr sz="2400">
+                <a:solidFill>
+                  <a:schemeClr val="tx1"/>
+                </a:solidFill>
+                <a:latin typeface="Times" charset="0"/>
+                <a:ea typeface="ＭＳ Ｐゴシック" charset="0"/>
+              </a:defRPr>
+            </a:lvl9pPr>
+          </a:lstStyle>
+          <a:p>
+            <a:pPr>
+              <a:spcBef>
+                <a:spcPct val="50000"/>
+              </a:spcBef>
+            </a:pPr>
+            <a:r>
+              <a:rPr lang="en-US" sz="1800" b="1">
+                <a:solidFill>
+                  <a:srgbClr val="FF00FF"/>
+                </a:solidFill>
+                <a:latin typeface="Arial" charset="0"/>
+              </a:rPr>
+              <a:t>Amount of data in the world</a:t>
+            </a:r>
+            <a:endParaRPr lang="en-US">
+              <a:latin typeface="Times New Roman" charset="0"/>
+            </a:endParaRPr>
+          </a:p>
+        </p:txBody>
+      </p:sp>
+      <p:sp>
+        <p:nvSpPr>
+          <p:cNvPr id="11" name="TextBox 10"/>
+          <p:cNvSpPr txBox="1"/>
+          <p:nvPr/>
+        </p:nvSpPr>
+        <p:spPr>
+          <a:xfrm>
+            <a:off x="1855724" y="5864088"/>
+            <a:ext cx="4130739" cy="338554"/>
+          </a:xfrm>
+          <a:prstGeom prst="rect">
+            <a:avLst/>
+          </a:prstGeom>
+          <a:noFill/>
+        </p:spPr>
+        <p:txBody>
+          <a:bodyPr wrap="square" rtlCol="0">
+            <a:spAutoFit/>
+          </a:bodyPr>
+          <a:lstStyle/>
+          <a:p>
+            <a:r>
+              <a:rPr lang="en-US" sz="1600" i="1" dirty="0" smtClean="0"/>
+              <a:t>slide </a:t>
+            </a:r>
+            <a:r>
+              <a:rPr lang="en-US" sz="1600" i="1" dirty="0" err="1" smtClean="0"/>
+              <a:t>src</a:t>
+            </a:r>
+            <a:r>
+              <a:rPr lang="en-US" sz="1600" i="1" dirty="0" smtClean="0"/>
+              <a:t>: Cecilia Aragon, UW HCDE</a:t>
+            </a:r>
+          </a:p>
+        </p:txBody>
+      </p:sp>
+    </p:spTree>
+    <p:extLst>
+      <p:ext uri="{BB962C8B-B14F-4D97-AF65-F5344CB8AC3E}">
+        <p14:creationId xmlns:p14="http://schemas.microsoft.com/office/powerpoint/2010/main" val="41364179"/>
+      </p:ext>
+    </p:extLst>
+  </p:cSld>
+  <p:clrMapOvr>
+    <a:masterClrMapping/>
+  </p:clrMapOvr>
+  <mc:AlternateContent xmlns:mc="http://schemas.openxmlformats.org/markup-compatibility/2006" xmlns:p14="http://schemas.microsoft.com/office/powerpoint/2010/main">
+    <mc:Choice Requires="p14">
+      <p:transition spd="slow" p14:dur="2000"/>
+    </mc:Choice>
+    <mc:Fallback xmlns="">
+      <p:transition xmlns:p14="http://schemas.microsoft.com/office/powerpoint/2010/main" spd="slow"/>
+    </mc:Fallback>
+  </mc:AlternateContent>
+  <p:timing>
+    <p:tnLst>
+      <p:par>
+        <p:cTn xmlns:p14="http://schemas.microsoft.com/office/powerpoint/2010/main" id="1" dur="indefinite" restart="never" nodeType="tmRoot"/>
+      </p:par>
+    </p:tnLst>
+  </p:timing>
+</p:sld>
+</file>
+
 <file path=ppt/slides/slide3.xml><?xml version="1.0" encoding="utf-8"?>
 <p:sld xmlns:a="http://schemas.openxmlformats.org/drawingml/2006/main" xmlns:r="http://schemas.openxmlformats.org/officeDocument/2006/relationships" xmlns:p="http://schemas.openxmlformats.org/presentationml/2006/main">
   <p:cSld>
@@ -10658,7 +12705,7 @@
           <a:p>
             <a:fld id="{7B55FEDD-6FD9-7942-8E57-CDDA6D5C3512}" type="datetime1">
               <a:rPr lang="en-US" smtClean="0"/>
-              <a:t>6/20/15</a:t>
+              <a:t>6/21/15</a:t>
             </a:fld>
             <a:endParaRPr lang="en-US"/>
           </a:p>
@@ -11342,7 +13389,7 @@
           <a:p>
             <a:fld id="{7B55FEDD-6FD9-7942-8E57-CDDA6D5C3512}" type="datetime1">
               <a:rPr lang="en-US" smtClean="0"/>
-              <a:t>6/20/15</a:t>
+              <a:t>6/21/15</a:t>
             </a:fld>
             <a:endParaRPr lang="en-US"/>
           </a:p>
@@ -11515,7 +13562,7 @@
           <a:p>
             <a:fld id="{7B55FEDD-6FD9-7942-8E57-CDDA6D5C3512}" type="datetime1">
               <a:rPr lang="en-US" smtClean="0"/>
-              <a:t>6/20/15</a:t>
+              <a:t>6/21/15</a:t>
             </a:fld>
             <a:endParaRPr lang="en-US"/>
           </a:p>

</xml_diff>